<commit_message>
Not finished.  Updating and working on code.
</commit_message>
<xml_diff>
--- a/predictors_recognition_7212021.pptx
+++ b/predictors_recognition_7212021.pptx
@@ -5,14 +5,13 @@
     <p:sldMasterId id="2147483648" r:id="rId1"/>
   </p:sldMasterIdLst>
   <p:sldIdLst>
-    <p:sldId id="257" r:id="rId2"/>
-    <p:sldId id="258" r:id="rId3"/>
-    <p:sldId id="259" r:id="rId4"/>
-    <p:sldId id="260" r:id="rId5"/>
-    <p:sldId id="270" r:id="rId6"/>
-    <p:sldId id="261" r:id="rId7"/>
-    <p:sldId id="262" r:id="rId8"/>
-    <p:sldId id="263" r:id="rId9"/>
+    <p:sldId id="258" r:id="rId2"/>
+    <p:sldId id="259" r:id="rId3"/>
+    <p:sldId id="260" r:id="rId4"/>
+    <p:sldId id="270" r:id="rId5"/>
+    <p:sldId id="261" r:id="rId6"/>
+    <p:sldId id="262" r:id="rId7"/>
+    <p:sldId id="263" r:id="rId8"/>
   </p:sldIdLst>
   <p:sldSz cx="12192000" cy="6858000"/>
   <p:notesSz cx="6858000" cy="9144000"/>
@@ -111,6 +110,11 @@
       </a:defRPr>
     </a:lvl9pPr>
   </p:defaultTextStyle>
+  <p:extLst>
+    <p:ext uri="{EFAFB233-063F-42B5-8137-9DF3F51BA10A}">
+      <p15:sldGuideLst xmlns:p15="http://schemas.microsoft.com/office/powerpoint/2012/main"/>
+    </p:ext>
+  </p:extLst>
 </p:presentation>
 </file>
 
@@ -261,7 +265,7 @@
           <a:p>
             <a:fld id="{9BDB7428-77DD-0242-9F7C-2B183699463A}" type="datetimeFigureOut">
               <a:rPr lang="en-US" smtClean="0"/>
-              <a:t>7/20/21</a:t>
+              <a:t>7/28/21</a:t>
             </a:fld>
             <a:endParaRPr lang="en-US"/>
           </a:p>
@@ -459,7 +463,7 @@
           <a:p>
             <a:fld id="{9BDB7428-77DD-0242-9F7C-2B183699463A}" type="datetimeFigureOut">
               <a:rPr lang="en-US" smtClean="0"/>
-              <a:t>7/20/21</a:t>
+              <a:t>7/28/21</a:t>
             </a:fld>
             <a:endParaRPr lang="en-US"/>
           </a:p>
@@ -667,7 +671,7 @@
           <a:p>
             <a:fld id="{9BDB7428-77DD-0242-9F7C-2B183699463A}" type="datetimeFigureOut">
               <a:rPr lang="en-US" smtClean="0"/>
-              <a:t>7/20/21</a:t>
+              <a:t>7/28/21</a:t>
             </a:fld>
             <a:endParaRPr lang="en-US"/>
           </a:p>
@@ -865,7 +869,7 @@
           <a:p>
             <a:fld id="{9BDB7428-77DD-0242-9F7C-2B183699463A}" type="datetimeFigureOut">
               <a:rPr lang="en-US" smtClean="0"/>
-              <a:t>7/20/21</a:t>
+              <a:t>7/28/21</a:t>
             </a:fld>
             <a:endParaRPr lang="en-US"/>
           </a:p>
@@ -1140,7 +1144,7 @@
           <a:p>
             <a:fld id="{9BDB7428-77DD-0242-9F7C-2B183699463A}" type="datetimeFigureOut">
               <a:rPr lang="en-US" smtClean="0"/>
-              <a:t>7/20/21</a:t>
+              <a:t>7/28/21</a:t>
             </a:fld>
             <a:endParaRPr lang="en-US"/>
           </a:p>
@@ -1405,7 +1409,7 @@
           <a:p>
             <a:fld id="{9BDB7428-77DD-0242-9F7C-2B183699463A}" type="datetimeFigureOut">
               <a:rPr lang="en-US" smtClean="0"/>
-              <a:t>7/20/21</a:t>
+              <a:t>7/28/21</a:t>
             </a:fld>
             <a:endParaRPr lang="en-US"/>
           </a:p>
@@ -1817,7 +1821,7 @@
           <a:p>
             <a:fld id="{9BDB7428-77DD-0242-9F7C-2B183699463A}" type="datetimeFigureOut">
               <a:rPr lang="en-US" smtClean="0"/>
-              <a:t>7/20/21</a:t>
+              <a:t>7/28/21</a:t>
             </a:fld>
             <a:endParaRPr lang="en-US"/>
           </a:p>
@@ -1958,7 +1962,7 @@
           <a:p>
             <a:fld id="{9BDB7428-77DD-0242-9F7C-2B183699463A}" type="datetimeFigureOut">
               <a:rPr lang="en-US" smtClean="0"/>
-              <a:t>7/20/21</a:t>
+              <a:t>7/28/21</a:t>
             </a:fld>
             <a:endParaRPr lang="en-US"/>
           </a:p>
@@ -2071,7 +2075,7 @@
           <a:p>
             <a:fld id="{9BDB7428-77DD-0242-9F7C-2B183699463A}" type="datetimeFigureOut">
               <a:rPr lang="en-US" smtClean="0"/>
-              <a:t>7/20/21</a:t>
+              <a:t>7/28/21</a:t>
             </a:fld>
             <a:endParaRPr lang="en-US"/>
           </a:p>
@@ -2382,7 +2386,7 @@
           <a:p>
             <a:fld id="{9BDB7428-77DD-0242-9F7C-2B183699463A}" type="datetimeFigureOut">
               <a:rPr lang="en-US" smtClean="0"/>
-              <a:t>7/20/21</a:t>
+              <a:t>7/28/21</a:t>
             </a:fld>
             <a:endParaRPr lang="en-US"/>
           </a:p>
@@ -2670,7 +2674,7 @@
           <a:p>
             <a:fld id="{9BDB7428-77DD-0242-9F7C-2B183699463A}" type="datetimeFigureOut">
               <a:rPr lang="en-US" smtClean="0"/>
-              <a:t>7/20/21</a:t>
+              <a:t>7/28/21</a:t>
             </a:fld>
             <a:endParaRPr lang="en-US"/>
           </a:p>
@@ -2911,7 +2915,7 @@
           <a:p>
             <a:fld id="{9BDB7428-77DD-0242-9F7C-2B183699463A}" type="datetimeFigureOut">
               <a:rPr lang="en-US" smtClean="0"/>
-              <a:t>7/20/21</a:t>
+              <a:t>7/28/21</a:t>
             </a:fld>
             <a:endParaRPr lang="en-US"/>
           </a:p>
@@ -3314,6 +3318,14 @@
 <file path=ppt/slides/slide1.xml><?xml version="1.0" encoding="utf-8"?>
 <p:sld xmlns:a="http://schemas.openxmlformats.org/drawingml/2006/main" xmlns:r="http://schemas.openxmlformats.org/officeDocument/2006/relationships" xmlns:p="http://schemas.openxmlformats.org/presentationml/2006/main">
   <p:cSld>
+    <p:bg>
+      <p:bgPr>
+        <a:solidFill>
+          <a:schemeClr val="bg1"/>
+        </a:solidFill>
+        <a:effectLst/>
+      </p:bgPr>
+    </p:bg>
     <p:spTree>
       <p:nvGrpSpPr>
         <p:cNvPr id="1" name=""/>
@@ -3328,37 +3340,12 @@
           <a:chExt cx="0" cy="0"/>
         </a:xfrm>
       </p:grpSpPr>
-      <p:sp>
-        <p:nvSpPr>
-          <p:cNvPr id="2" name="Title 1">
-            <a:extLst>
-              <a:ext uri="{FF2B5EF4-FFF2-40B4-BE49-F238E27FC236}">
-                <a16:creationId xmlns:a16="http://schemas.microsoft.com/office/drawing/2014/main" id="{45974BFC-0072-BA48-9374-35E89C30F09D}"/>
-              </a:ext>
-            </a:extLst>
-          </p:cNvPr>
-          <p:cNvSpPr>
-            <a:spLocks noGrp="1"/>
-          </p:cNvSpPr>
-          <p:nvPr>
-            <p:ph type="title"/>
-          </p:nvPr>
-        </p:nvSpPr>
-        <p:spPr/>
-        <p:txBody>
-          <a:bodyPr/>
-          <a:lstStyle/>
-          <a:p>
-            <a:endParaRPr lang="en-US"/>
-          </a:p>
-        </p:txBody>
-      </p:sp>
       <p:pic>
         <p:nvPicPr>
-          <p:cNvPr id="5" name="Content Placeholder 4" descr="Chart&#10;&#10;Description automatically generated">
-            <a:extLst>
-              <a:ext uri="{FF2B5EF4-FFF2-40B4-BE49-F238E27FC236}">
-                <a16:creationId xmlns:a16="http://schemas.microsoft.com/office/drawing/2014/main" id="{423C4147-E27B-974B-8BAA-53DB5EC75AF1}"/>
+          <p:cNvPr id="6" name="Content Placeholder 4" descr="Chart, line chart&#10;&#10;Description automatically generated">
+            <a:extLst>
+              <a:ext uri="{FF2B5EF4-FFF2-40B4-BE49-F238E27FC236}">
+                <a16:creationId xmlns:a16="http://schemas.microsoft.com/office/drawing/2014/main" id="{332281E3-6EEB-A746-9B26-5E4FF0D7C41F}"/>
               </a:ext>
             </a:extLst>
           </p:cNvPr>
@@ -3377,93 +3364,12 @@
         </p:blipFill>
         <p:spPr>
           <a:xfrm>
-            <a:off x="3195108" y="1825625"/>
-            <a:ext cx="5801784" cy="4351338"/>
+            <a:off x="2394293" y="643466"/>
+            <a:ext cx="7403413" cy="5571067"/>
           </a:xfrm>
-        </p:spPr>
-      </p:pic>
-    </p:spTree>
-    <p:extLst>
-      <p:ext uri="{BB962C8B-B14F-4D97-AF65-F5344CB8AC3E}">
-        <p14:creationId xmlns:p14="http://schemas.microsoft.com/office/powerpoint/2010/main" val="2202632787"/>
-      </p:ext>
-    </p:extLst>
-  </p:cSld>
-  <p:clrMapOvr>
-    <a:masterClrMapping/>
-  </p:clrMapOvr>
-</p:sld>
-</file>
-
-<file path=ppt/slides/slide2.xml><?xml version="1.0" encoding="utf-8"?>
-<p:sld xmlns:a="http://schemas.openxmlformats.org/drawingml/2006/main" xmlns:r="http://schemas.openxmlformats.org/officeDocument/2006/relationships" xmlns:p="http://schemas.openxmlformats.org/presentationml/2006/main">
-  <p:cSld>
-    <p:spTree>
-      <p:nvGrpSpPr>
-        <p:cNvPr id="1" name=""/>
-        <p:cNvGrpSpPr/>
-        <p:nvPr/>
-      </p:nvGrpSpPr>
-      <p:grpSpPr>
-        <a:xfrm>
-          <a:off x="0" y="0"/>
-          <a:ext cx="0" cy="0"/>
-          <a:chOff x="0" y="0"/>
-          <a:chExt cx="0" cy="0"/>
-        </a:xfrm>
-      </p:grpSpPr>
-      <p:sp>
-        <p:nvSpPr>
-          <p:cNvPr id="2" name="Title 1">
-            <a:extLst>
-              <a:ext uri="{FF2B5EF4-FFF2-40B4-BE49-F238E27FC236}">
-                <a16:creationId xmlns:a16="http://schemas.microsoft.com/office/drawing/2014/main" id="{A77D357B-D26D-7745-957B-192BEAE3E51E}"/>
-              </a:ext>
-            </a:extLst>
-          </p:cNvPr>
-          <p:cNvSpPr>
-            <a:spLocks noGrp="1"/>
-          </p:cNvSpPr>
-          <p:nvPr>
-            <p:ph type="title"/>
-          </p:nvPr>
-        </p:nvSpPr>
-        <p:spPr/>
-        <p:txBody>
-          <a:bodyPr/>
-          <a:lstStyle/>
-          <a:p>
-            <a:endParaRPr lang="en-US"/>
-          </a:p>
-        </p:txBody>
-      </p:sp>
-      <p:pic>
-        <p:nvPicPr>
-          <p:cNvPr id="5" name="Content Placeholder 4" descr="Chart, line chart&#10;&#10;Description automatically generated">
-            <a:extLst>
-              <a:ext uri="{FF2B5EF4-FFF2-40B4-BE49-F238E27FC236}">
-                <a16:creationId xmlns:a16="http://schemas.microsoft.com/office/drawing/2014/main" id="{F833E34D-717F-F14A-AF66-99F97BDA195D}"/>
-              </a:ext>
-            </a:extLst>
-          </p:cNvPr>
-          <p:cNvPicPr>
-            <a:picLocks noGrp="1" noChangeAspect="1"/>
-          </p:cNvPicPr>
-          <p:nvPr>
-            <p:ph idx="1"/>
-          </p:nvPr>
-        </p:nvPicPr>
-        <p:blipFill>
-          <a:blip r:embed="rId2"/>
-          <a:stretch>
-            <a:fillRect/>
-          </a:stretch>
-        </p:blipFill>
-        <p:spPr>
-          <a:xfrm>
-            <a:off x="3195108" y="1825625"/>
-            <a:ext cx="5801784" cy="4351338"/>
-          </a:xfrm>
+          <a:prstGeom prst="rect">
+            <a:avLst/>
+          </a:prstGeom>
         </p:spPr>
       </p:pic>
     </p:spTree>
@@ -3479,7 +3385,7 @@
 </p:sld>
 </file>
 
-<file path=ppt/slides/slide3.xml><?xml version="1.0" encoding="utf-8"?>
+<file path=ppt/slides/slide2.xml><?xml version="1.0" encoding="utf-8"?>
 <p:sld xmlns:a="http://schemas.openxmlformats.org/drawingml/2006/main" xmlns:r="http://schemas.openxmlformats.org/officeDocument/2006/relationships" xmlns:p="http://schemas.openxmlformats.org/presentationml/2006/main">
   <p:cSld>
     <p:spTree>
@@ -3563,7 +3469,7 @@
 </p:sld>
 </file>
 
-<file path=ppt/slides/slide4.xml><?xml version="1.0" encoding="utf-8"?>
+<file path=ppt/slides/slide3.xml><?xml version="1.0" encoding="utf-8"?>
 <p:sld xmlns:a="http://schemas.openxmlformats.org/drawingml/2006/main" xmlns:r="http://schemas.openxmlformats.org/officeDocument/2006/relationships" xmlns:p="http://schemas.openxmlformats.org/presentationml/2006/main">
   <p:cSld>
     <p:spTree>
@@ -3647,7 +3553,7 @@
 </p:sld>
 </file>
 
-<file path=ppt/slides/slide5.xml><?xml version="1.0" encoding="utf-8"?>
+<file path=ppt/slides/slide4.xml><?xml version="1.0" encoding="utf-8"?>
 <p:sld xmlns:a="http://schemas.openxmlformats.org/drawingml/2006/main" xmlns:r="http://schemas.openxmlformats.org/officeDocument/2006/relationships" xmlns:p="http://schemas.openxmlformats.org/presentationml/2006/main">
   <p:cSld>
     <p:spTree>
@@ -3731,7 +3637,7 @@
 </p:sld>
 </file>
 
-<file path=ppt/slides/slide6.xml><?xml version="1.0" encoding="utf-8"?>
+<file path=ppt/slides/slide5.xml><?xml version="1.0" encoding="utf-8"?>
 <p:sld xmlns:a="http://schemas.openxmlformats.org/drawingml/2006/main" xmlns:r="http://schemas.openxmlformats.org/officeDocument/2006/relationships" xmlns:p="http://schemas.openxmlformats.org/presentationml/2006/main">
   <p:cSld>
     <p:spTree>
@@ -3815,7 +3721,7 @@
 </p:sld>
 </file>
 
-<file path=ppt/slides/slide7.xml><?xml version="1.0" encoding="utf-8"?>
+<file path=ppt/slides/slide6.xml><?xml version="1.0" encoding="utf-8"?>
 <p:sld xmlns:a="http://schemas.openxmlformats.org/drawingml/2006/main" xmlns:r="http://schemas.openxmlformats.org/officeDocument/2006/relationships" xmlns:p="http://schemas.openxmlformats.org/presentationml/2006/main">
   <p:cSld>
     <p:spTree>
@@ -3899,7 +3805,7 @@
 </p:sld>
 </file>
 
-<file path=ppt/slides/slide8.xml><?xml version="1.0" encoding="utf-8"?>
+<file path=ppt/slides/slide7.xml><?xml version="1.0" encoding="utf-8"?>
 <p:sld xmlns:a="http://schemas.openxmlformats.org/drawingml/2006/main" xmlns:r="http://schemas.openxmlformats.org/officeDocument/2006/relationships" xmlns:p="http://schemas.openxmlformats.org/presentationml/2006/main">
   <p:cSld>
     <p:spTree>

</xml_diff>